<commit_message>
Updates to Template.pptx metadata.
</commit_message>
<xml_diff>
--- a/Slides/Template.pptx
+++ b/Slides/Template.pptx
@@ -107,6 +107,11 @@
       </a:defRPr>
     </a:lvl9pPr>
   </p:defaultTextStyle>
+  <p:extLst>
+    <p:ext uri="{EFAFB233-063F-42B5-8137-9DF3F51BA10A}">
+      <p15:sldGuideLst xmlns:p15="http://schemas.microsoft.com/office/powerpoint/2012/main"/>
+    </p:ext>
+  </p:extLst>
 </p:presentation>
 </file>
 
@@ -192,7 +197,7 @@
           <a:p>
             <a:fld id="{7B04D10A-81D1-8748-8404-C44E2799F913}" type="datetimeFigureOut">
               <a:rPr lang="en-US" smtClean="0"/>
-              <a:t>12/27/15</a:t>
+              <a:t>9/12/17</a:t>
             </a:fld>
             <a:endParaRPr lang="en-US"/>
           </a:p>
@@ -460,6 +465,90 @@
 </p:notesMaster>
 </file>
 
+<file path=ppt/notesSlides/notesSlide1.xml><?xml version="1.0" encoding="utf-8"?>
+<p:notes xmlns:a="http://schemas.openxmlformats.org/drawingml/2006/main" xmlns:r="http://schemas.openxmlformats.org/officeDocument/2006/relationships" xmlns:p="http://schemas.openxmlformats.org/presentationml/2006/main">
+  <p:cSld>
+    <p:spTree>
+      <p:nvGrpSpPr>
+        <p:cNvPr id="1" name=""/>
+        <p:cNvGrpSpPr/>
+        <p:nvPr/>
+      </p:nvGrpSpPr>
+      <p:grpSpPr>
+        <a:xfrm>
+          <a:off x="0" y="0"/>
+          <a:ext cx="0" cy="0"/>
+          <a:chOff x="0" y="0"/>
+          <a:chExt cx="0" cy="0"/>
+        </a:xfrm>
+      </p:grpSpPr>
+      <p:sp>
+        <p:nvSpPr>
+          <p:cNvPr id="2" name="Slide Image Placeholder 1"/>
+          <p:cNvSpPr>
+            <a:spLocks noGrp="1" noRot="1" noChangeAspect="1"/>
+          </p:cNvSpPr>
+          <p:nvPr>
+            <p:ph type="sldImg"/>
+          </p:nvPr>
+        </p:nvSpPr>
+        <p:spPr/>
+      </p:sp>
+      <p:sp>
+        <p:nvSpPr>
+          <p:cNvPr id="3" name="Notes Placeholder 2"/>
+          <p:cNvSpPr>
+            <a:spLocks noGrp="1"/>
+          </p:cNvSpPr>
+          <p:nvPr>
+            <p:ph type="body" idx="1"/>
+          </p:nvPr>
+        </p:nvSpPr>
+        <p:spPr/>
+        <p:txBody>
+          <a:bodyPr/>
+          <a:lstStyle/>
+          <a:p>
+            <a:endParaRPr lang="en-US"/>
+          </a:p>
+        </p:txBody>
+      </p:sp>
+      <p:sp>
+        <p:nvSpPr>
+          <p:cNvPr id="4" name="Slide Number Placeholder 3"/>
+          <p:cNvSpPr>
+            <a:spLocks noGrp="1"/>
+          </p:cNvSpPr>
+          <p:nvPr>
+            <p:ph type="sldNum" sz="quarter" idx="10"/>
+          </p:nvPr>
+        </p:nvSpPr>
+        <p:spPr/>
+        <p:txBody>
+          <a:bodyPr/>
+          <a:lstStyle/>
+          <a:p>
+            <a:fld id="{862DBF5F-E884-8D4B-8536-498293E3FBD0}" type="slidenum">
+              <a:rPr lang="en-US" smtClean="0"/>
+              <a:t>1</a:t>
+            </a:fld>
+            <a:endParaRPr lang="en-US"/>
+          </a:p>
+        </p:txBody>
+      </p:sp>
+    </p:spTree>
+    <p:extLst>
+      <p:ext uri="{BB962C8B-B14F-4D97-AF65-F5344CB8AC3E}">
+        <p14:creationId xmlns:p14="http://schemas.microsoft.com/office/powerpoint/2010/main" val="1236802706"/>
+      </p:ext>
+    </p:extLst>
+  </p:cSld>
+  <p:clrMapOvr>
+    <a:masterClrMapping/>
+  </p:clrMapOvr>
+</p:notes>
+</file>
+
 <file path=ppt/slideLayouts/slideLayout1.xml><?xml version="1.0" encoding="utf-8"?>
 <p:sldLayout xmlns:a="http://schemas.openxmlformats.org/drawingml/2006/main" xmlns:r="http://schemas.openxmlformats.org/officeDocument/2006/relationships" xmlns:p="http://schemas.openxmlformats.org/presentationml/2006/main" type="title" preserve="1">
   <p:cSld name="Title Slide">
@@ -589,9 +678,9 @@
           <a:bodyPr/>
           <a:lstStyle/>
           <a:p>
-            <a:fld id="{6309EB05-8444-F245-956D-C637459D628A}" type="datetime1">
-              <a:rPr lang="en-US" smtClean="0"/>
-              <a:t>12/27/15</a:t>
+            <a:fld id="{98859673-CFCF-B547-9B44-AE13EC61369B}" type="datetime1">
+              <a:rPr lang="en-US" smtClean="0"/>
+              <a:t>9/12/17</a:t>
             </a:fld>
             <a:endParaRPr lang="en-US"/>
           </a:p>
@@ -613,8 +702,8 @@
           <a:lstStyle/>
           <a:p>
             <a:r>
-              <a:rPr lang="en-US" dirty="0" smtClean="0"/>
-              <a:t>EECS 582 – W16</a:t>
+              <a:rPr lang="en-US" smtClean="0"/>
+              <a:t>EECS 598 – F17</a:t>
             </a:r>
             <a:endParaRPr lang="en-US" dirty="0"/>
           </a:p>
@@ -763,9 +852,9 @@
           <a:bodyPr/>
           <a:lstStyle/>
           <a:p>
-            <a:fld id="{91FB355F-372B-0B48-91E4-B9E95C6DDB80}" type="datetime1">
-              <a:rPr lang="en-US" smtClean="0"/>
-              <a:t>12/27/15</a:t>
+            <a:fld id="{FE40CDF0-3A3F-7143-ABEE-7EF6E5589F5C}" type="datetime1">
+              <a:rPr lang="en-US" smtClean="0"/>
+              <a:t>9/12/17</a:t>
             </a:fld>
             <a:endParaRPr lang="en-US"/>
           </a:p>
@@ -788,7 +877,7 @@
           <a:p>
             <a:r>
               <a:rPr lang="en-US" smtClean="0"/>
-              <a:t>EECS 582 – W16</a:t>
+              <a:t>EECS 598 – F17</a:t>
             </a:r>
             <a:endParaRPr lang="en-US"/>
           </a:p>
@@ -947,9 +1036,9 @@
           <a:bodyPr/>
           <a:lstStyle/>
           <a:p>
-            <a:fld id="{8D77F92F-DAD0-294D-90C2-D8B0AEDBB82F}" type="datetime1">
-              <a:rPr lang="en-US" smtClean="0"/>
-              <a:t>12/27/15</a:t>
+            <a:fld id="{3FD8D59A-7299-DB47-8EC3-61EE9DCEEE26}" type="datetime1">
+              <a:rPr lang="en-US" smtClean="0"/>
+              <a:t>9/12/17</a:t>
             </a:fld>
             <a:endParaRPr lang="en-US"/>
           </a:p>
@@ -972,7 +1061,7 @@
           <a:p>
             <a:r>
               <a:rPr lang="en-US" smtClean="0"/>
-              <a:t>EECS 582 – W16</a:t>
+              <a:t>EECS 598 – F17</a:t>
             </a:r>
             <a:endParaRPr lang="en-US"/>
           </a:p>
@@ -1121,9 +1210,9 @@
           <a:bodyPr/>
           <a:lstStyle/>
           <a:p>
-            <a:fld id="{903FD91D-E05B-0E4F-A0BE-FF0A133512F8}" type="datetime1">
-              <a:rPr lang="en-US" smtClean="0"/>
-              <a:t>12/27/15</a:t>
+            <a:fld id="{343DC4D9-86A9-6F41-8530-DE92A74CC47B}" type="datetime1">
+              <a:rPr lang="en-US" smtClean="0"/>
+              <a:t>9/12/17</a:t>
             </a:fld>
             <a:endParaRPr lang="en-US"/>
           </a:p>
@@ -1146,7 +1235,7 @@
           <a:p>
             <a:r>
               <a:rPr lang="en-US" smtClean="0"/>
-              <a:t>EECS 582 – W16</a:t>
+              <a:t>EECS 598 – F17</a:t>
             </a:r>
             <a:endParaRPr lang="en-US"/>
           </a:p>
@@ -1371,9 +1460,9 @@
           <a:bodyPr/>
           <a:lstStyle/>
           <a:p>
-            <a:fld id="{2867DFE4-B686-4E4D-A44B-BBFA4F93760C}" type="datetime1">
-              <a:rPr lang="en-US" smtClean="0"/>
-              <a:t>12/27/15</a:t>
+            <a:fld id="{054ECDBE-EF16-484D-B529-4357C7E8E297}" type="datetime1">
+              <a:rPr lang="en-US" smtClean="0"/>
+              <a:t>9/12/17</a:t>
             </a:fld>
             <a:endParaRPr lang="en-US"/>
           </a:p>
@@ -1396,7 +1485,7 @@
           <a:p>
             <a:r>
               <a:rPr lang="en-US" smtClean="0"/>
-              <a:t>EECS 582 – W16</a:t>
+              <a:t>EECS 598 – F17</a:t>
             </a:r>
             <a:endParaRPr lang="en-US"/>
           </a:p>
@@ -1607,9 +1696,9 @@
           <a:bodyPr/>
           <a:lstStyle/>
           <a:p>
-            <a:fld id="{1BEFD070-48B1-7A4C-8201-A5F0428B04B5}" type="datetime1">
-              <a:rPr lang="en-US" smtClean="0"/>
-              <a:t>12/27/15</a:t>
+            <a:fld id="{209C97BB-A13A-FE40-BA2E-78BF1D4A5327}" type="datetime1">
+              <a:rPr lang="en-US" smtClean="0"/>
+              <a:t>9/12/17</a:t>
             </a:fld>
             <a:endParaRPr lang="en-US"/>
           </a:p>
@@ -1632,7 +1721,7 @@
           <a:p>
             <a:r>
               <a:rPr lang="en-US" smtClean="0"/>
-              <a:t>EECS 582 – W16</a:t>
+              <a:t>EECS 598 – F17</a:t>
             </a:r>
             <a:endParaRPr lang="en-US"/>
           </a:p>
@@ -1978,9 +2067,9 @@
           <a:bodyPr/>
           <a:lstStyle/>
           <a:p>
-            <a:fld id="{1E537E95-22E8-9D46-BCB7-A1A2B4615323}" type="datetime1">
-              <a:rPr lang="en-US" smtClean="0"/>
-              <a:t>12/27/15</a:t>
+            <a:fld id="{AA5C1895-BC7C-584B-A9BB-CB34F7C1C179}" type="datetime1">
+              <a:rPr lang="en-US" smtClean="0"/>
+              <a:t>9/12/17</a:t>
             </a:fld>
             <a:endParaRPr lang="en-US"/>
           </a:p>
@@ -2003,7 +2092,7 @@
           <a:p>
             <a:r>
               <a:rPr lang="en-US" smtClean="0"/>
-              <a:t>EECS 582 – W16</a:t>
+              <a:t>EECS 598 – F17</a:t>
             </a:r>
             <a:endParaRPr lang="en-US"/>
           </a:p>
@@ -2100,9 +2189,9 @@
           <a:bodyPr/>
           <a:lstStyle/>
           <a:p>
-            <a:fld id="{54A05905-29EE-C44F-9F50-8500FD40B029}" type="datetime1">
-              <a:rPr lang="en-US" smtClean="0"/>
-              <a:t>12/27/15</a:t>
+            <a:fld id="{04ECA82D-245B-7944-BAF0-4BD7F6332E64}" type="datetime1">
+              <a:rPr lang="en-US" smtClean="0"/>
+              <a:t>9/12/17</a:t>
             </a:fld>
             <a:endParaRPr lang="en-US"/>
           </a:p>
@@ -2125,7 +2214,7 @@
           <a:p>
             <a:r>
               <a:rPr lang="en-US" smtClean="0"/>
-              <a:t>EECS 582 – W16</a:t>
+              <a:t>EECS 598 – F17</a:t>
             </a:r>
             <a:endParaRPr lang="en-US"/>
           </a:p>
@@ -2199,9 +2288,9 @@
           <a:bodyPr/>
           <a:lstStyle/>
           <a:p>
-            <a:fld id="{3A42536A-501F-2D4B-B940-CF3CAD36ABFE}" type="datetime1">
-              <a:rPr lang="en-US" smtClean="0"/>
-              <a:t>12/27/15</a:t>
+            <a:fld id="{7A0E46CE-38AE-DD48-AD30-E319084F2DCD}" type="datetime1">
+              <a:rPr lang="en-US" smtClean="0"/>
+              <a:t>9/12/17</a:t>
             </a:fld>
             <a:endParaRPr lang="en-US"/>
           </a:p>
@@ -2224,7 +2313,7 @@
           <a:p>
             <a:r>
               <a:rPr lang="en-US" smtClean="0"/>
-              <a:t>EECS 582 – W16</a:t>
+              <a:t>EECS 598 – F17</a:t>
             </a:r>
             <a:endParaRPr lang="en-US"/>
           </a:p>
@@ -2480,9 +2569,9 @@
           <a:bodyPr/>
           <a:lstStyle/>
           <a:p>
-            <a:fld id="{08E8544C-4612-904E-948E-02F5DF3365BF}" type="datetime1">
-              <a:rPr lang="en-US" smtClean="0"/>
-              <a:t>12/27/15</a:t>
+            <a:fld id="{18424FE1-7E25-0D40-9589-21526CF12C20}" type="datetime1">
+              <a:rPr lang="en-US" smtClean="0"/>
+              <a:t>9/12/17</a:t>
             </a:fld>
             <a:endParaRPr lang="en-US"/>
           </a:p>
@@ -2505,7 +2594,7 @@
           <a:p>
             <a:r>
               <a:rPr lang="en-US" smtClean="0"/>
-              <a:t>EECS 582 – W16</a:t>
+              <a:t>EECS 598 – F17</a:t>
             </a:r>
             <a:endParaRPr lang="en-US"/>
           </a:p>
@@ -2737,9 +2826,9 @@
           <a:bodyPr/>
           <a:lstStyle/>
           <a:p>
-            <a:fld id="{BAF07C18-6A4C-494C-A5D7-0469F2CFEBF3}" type="datetime1">
-              <a:rPr lang="en-US" smtClean="0"/>
-              <a:t>12/27/15</a:t>
+            <a:fld id="{721F9EE0-8E49-A040-B038-5FDECE63E320}" type="datetime1">
+              <a:rPr lang="en-US" smtClean="0"/>
+              <a:t>9/12/17</a:t>
             </a:fld>
             <a:endParaRPr lang="en-US"/>
           </a:p>
@@ -2762,7 +2851,7 @@
           <a:p>
             <a:r>
               <a:rPr lang="en-US" smtClean="0"/>
-              <a:t>EECS 582 – W16</a:t>
+              <a:t>EECS 598 – F17</a:t>
             </a:r>
             <a:endParaRPr lang="en-US"/>
           </a:p>
@@ -2957,9 +3046,9 @@
             </a:lvl1pPr>
           </a:lstStyle>
           <a:p>
-            <a:fld id="{0044240B-4341-7E48-A33D-719C7F46D8F2}" type="datetime1">
-              <a:rPr lang="en-US" smtClean="0"/>
-              <a:t>12/27/15</a:t>
+            <a:fld id="{CA610DB4-F5B6-3241-ABD4-EF8B23B32339}" type="datetime1">
+              <a:rPr lang="en-US" smtClean="0"/>
+              <a:t>9/12/17</a:t>
             </a:fld>
             <a:endParaRPr lang="en-US"/>
           </a:p>
@@ -3002,8 +3091,8 @@
           </a:lstStyle>
           <a:p>
             <a:r>
-              <a:rPr lang="en-US" dirty="0" smtClean="0"/>
-              <a:t>EECS 582 – W16</a:t>
+              <a:rPr lang="en-US" smtClean="0"/>
+              <a:t>EECS 598 – F17</a:t>
             </a:r>
             <a:endParaRPr lang="en-US" dirty="0"/>
           </a:p>
@@ -3431,7 +3520,7 @@
           <a:p>
             <a:r>
               <a:rPr lang="en-US" smtClean="0"/>
-              <a:t>EECS 582 – W16</a:t>
+              <a:t>EECS 598 – F17</a:t>
             </a:r>
             <a:endParaRPr lang="en-US" dirty="0"/>
           </a:p>

</xml_diff>